<commit_message>
update chrome test case
</commit_message>
<xml_diff>
--- a/documents/QA.pptx
+++ b/documents/QA.pptx
@@ -370,7 +370,7 @@
           <a:p>
             <a:fld id="{225922D7-1ED3-904F-B321-F881A2B91019}" type="datetimeFigureOut">
               <a:rPr lang="en-US" smtClean="0"/>
-              <a:t>3/20/2017</a:t>
+              <a:t>5/20/17</a:t>
             </a:fld>
             <a:endParaRPr lang="en-US"/>
           </a:p>
@@ -704,7 +704,7 @@
           <a:p>
             <a:fld id="{225922D7-1ED3-904F-B321-F881A2B91019}" type="datetimeFigureOut">
               <a:rPr lang="en-US" smtClean="0"/>
-              <a:t>3/20/2017</a:t>
+              <a:t>5/20/17</a:t>
             </a:fld>
             <a:endParaRPr lang="en-US"/>
           </a:p>
@@ -943,7 +943,7 @@
           <a:p>
             <a:fld id="{225922D7-1ED3-904F-B321-F881A2B91019}" type="datetimeFigureOut">
               <a:rPr lang="en-US" smtClean="0"/>
-              <a:t>3/20/2017</a:t>
+              <a:t>5/20/17</a:t>
             </a:fld>
             <a:endParaRPr lang="en-US"/>
           </a:p>
@@ -1243,7 +1243,7 @@
           <a:p>
             <a:fld id="{225922D7-1ED3-904F-B321-F881A2B91019}" type="datetimeFigureOut">
               <a:rPr lang="en-US" smtClean="0"/>
-              <a:t>3/20/2017</a:t>
+              <a:t>5/20/17</a:t>
             </a:fld>
             <a:endParaRPr lang="en-US"/>
           </a:p>
@@ -1459,7 +1459,7 @@
           <a:p>
             <a:fld id="{225922D7-1ED3-904F-B321-F881A2B91019}" type="datetimeFigureOut">
               <a:rPr lang="en-US" smtClean="0"/>
-              <a:t>3/20/2017</a:t>
+              <a:t>5/20/17</a:t>
             </a:fld>
             <a:endParaRPr lang="en-US"/>
           </a:p>
@@ -1819,7 +1819,7 @@
           <a:p>
             <a:fld id="{225922D7-1ED3-904F-B321-F881A2B91019}" type="datetimeFigureOut">
               <a:rPr lang="en-US" smtClean="0"/>
-              <a:t>3/20/2017</a:t>
+              <a:t>5/20/17</a:t>
             </a:fld>
             <a:endParaRPr lang="en-US"/>
           </a:p>
@@ -2086,7 +2086,7 @@
           <a:p>
             <a:fld id="{225922D7-1ED3-904F-B321-F881A2B91019}" type="datetimeFigureOut">
               <a:rPr lang="en-US" smtClean="0"/>
-              <a:t>3/20/2017</a:t>
+              <a:t>5/20/17</a:t>
             </a:fld>
             <a:endParaRPr lang="en-US"/>
           </a:p>
@@ -2176,7 +2176,7 @@
           <a:p>
             <a:fld id="{225922D7-1ED3-904F-B321-F881A2B91019}" type="datetimeFigureOut">
               <a:rPr lang="en-US" smtClean="0"/>
-              <a:t>3/20/2017</a:t>
+              <a:t>5/20/17</a:t>
             </a:fld>
             <a:endParaRPr lang="en-US"/>
           </a:p>
@@ -2477,7 +2477,7 @@
           <a:p>
             <a:fld id="{225922D7-1ED3-904F-B321-F881A2B91019}" type="datetimeFigureOut">
               <a:rPr lang="en-US" smtClean="0"/>
-              <a:t>3/20/2017</a:t>
+              <a:t>5/20/17</a:t>
             </a:fld>
             <a:endParaRPr lang="en-US"/>
           </a:p>
@@ -2783,7 +2783,7 @@
           <a:p>
             <a:fld id="{225922D7-1ED3-904F-B321-F881A2B91019}" type="datetimeFigureOut">
               <a:rPr lang="en-US" smtClean="0"/>
-              <a:t>3/20/2017</a:t>
+              <a:t>5/20/17</a:t>
             </a:fld>
             <a:endParaRPr lang="en-US"/>
           </a:p>
@@ -3063,7 +3063,7 @@
           <a:p>
             <a:fld id="{225922D7-1ED3-904F-B321-F881A2B91019}" type="datetimeFigureOut">
               <a:rPr lang="en-US" smtClean="0"/>
-              <a:t>3/20/2017</a:t>
+              <a:t>5/20/17</a:t>
             </a:fld>
             <a:endParaRPr lang="en-US"/>
           </a:p>
@@ -3471,7 +3471,7 @@
           <a:p>
             <a:fld id="{225922D7-1ED3-904F-B321-F881A2B91019}" type="datetimeFigureOut">
               <a:rPr lang="en-US" smtClean="0"/>
-              <a:t>3/20/2017</a:t>
+              <a:t>5/20/17</a:t>
             </a:fld>
             <a:endParaRPr lang="en-US"/>
           </a:p>
@@ -4031,7 +4031,7 @@
           <a:p>
             <a:fld id="{225922D7-1ED3-904F-B321-F881A2B91019}" type="datetimeFigureOut">
               <a:rPr lang="en-US" smtClean="0"/>
-              <a:t>3/20/2017</a:t>
+              <a:t>5/20/17</a:t>
             </a:fld>
             <a:endParaRPr lang="en-US"/>
           </a:p>
@@ -4179,7 +4179,7 @@
           <a:p>
             <a:fld id="{225922D7-1ED3-904F-B321-F881A2B91019}" type="datetimeFigureOut">
               <a:rPr lang="en-US" smtClean="0"/>
-              <a:t>3/20/2017</a:t>
+              <a:t>5/20/17</a:t>
             </a:fld>
             <a:endParaRPr lang="en-US"/>
           </a:p>
@@ -4269,7 +4269,7 @@
           <a:p>
             <a:fld id="{225922D7-1ED3-904F-B321-F881A2B91019}" type="datetimeFigureOut">
               <a:rPr lang="en-US" smtClean="0"/>
-              <a:t>3/20/2017</a:t>
+              <a:t>5/20/17</a:t>
             </a:fld>
             <a:endParaRPr lang="en-US"/>
           </a:p>
@@ -4611,7 +4611,7 @@
           <a:p>
             <a:fld id="{225922D7-1ED3-904F-B321-F881A2B91019}" type="datetimeFigureOut">
               <a:rPr lang="en-US" smtClean="0"/>
-              <a:t>3/20/2017</a:t>
+              <a:t>5/20/17</a:t>
             </a:fld>
             <a:endParaRPr lang="en-US"/>
           </a:p>
@@ -4820,7 +4820,7 @@
           <a:p>
             <a:fld id="{225922D7-1ED3-904F-B321-F881A2B91019}" type="datetimeFigureOut">
               <a:rPr lang="en-US" smtClean="0"/>
-              <a:t>3/20/2017</a:t>
+              <a:t>5/20/17</a:t>
             </a:fld>
             <a:endParaRPr lang="en-US"/>
           </a:p>
@@ -5372,25 +5372,8 @@
           <a:lstStyle/>
           <a:p>
             <a:r>
-              <a:rPr lang="en-US" dirty="0"/>
-              <a:t>Charles </a:t>
-            </a:r>
-            <a:r>
-              <a:rPr lang="en-US" dirty="0">
-                <a:hlinkClick r:id="rId2"/>
-              </a:rPr>
-              <a:t>Cao@apigm.org</a:t>
-            </a:r>
-            <a:endParaRPr lang="en-US" dirty="0"/>
-          </a:p>
-          <a:p>
-            <a:r>
-              <a:rPr lang="en-US" dirty="0"/>
-              <a:t>01.20.</a:t>
-            </a:r>
-            <a:r>
-              <a:rPr lang="en-US" altLang="zh-CN" dirty="0"/>
-              <a:t> 2017</a:t>
+              <a:rPr lang="en-US" altLang="zh-CN" dirty="0" err="1" smtClean="0"/>
+              <a:t>ccao@ecvictor.com</a:t>
             </a:r>
             <a:endParaRPr lang="en-US" dirty="0"/>
           </a:p>
@@ -7976,8 +7959,116 @@
           </a:p>
           <a:p>
             <a:r>
+              <a:rPr lang="en-US" altLang="zh-CN" dirty="0" smtClean="0"/>
+              <a:t>Automation</a:t>
+            </a:r>
+            <a:r>
+              <a:rPr lang="zh-CN" altLang="en-US" dirty="0" smtClean="0"/>
+              <a:t> </a:t>
+            </a:r>
+            <a:r>
+              <a:rPr lang="en-US" altLang="zh-CN" dirty="0" smtClean="0"/>
+              <a:t>Team</a:t>
+            </a:r>
+            <a:r>
+              <a:rPr lang="zh-CN" altLang="en-US" dirty="0" smtClean="0"/>
+              <a:t> </a:t>
+            </a:r>
+            <a:r>
+              <a:rPr lang="en-US" altLang="zh-CN" dirty="0" smtClean="0"/>
+              <a:t>lead</a:t>
+            </a:r>
+            <a:r>
+              <a:rPr lang="en-US" altLang="zh-CN" dirty="0" smtClean="0"/>
+              <a:t>, </a:t>
+            </a:r>
+            <a:r>
               <a:rPr lang="en-US" altLang="zh-CN" dirty="0"/>
-              <a:t>Senior QA Engineer, Business Owner.10+ years working experience,  He promoted to senior QA from an intern by only 3 years.</a:t>
+              <a:t>Business Owner.10+ years working experience,  He promoted to senior QA from an intern </a:t>
+            </a:r>
+            <a:r>
+              <a:rPr lang="en-US" altLang="zh-CN" dirty="0" smtClean="0"/>
+              <a:t>in</a:t>
+            </a:r>
+            <a:r>
+              <a:rPr lang="zh-CN" altLang="en-US" dirty="0" smtClean="0"/>
+              <a:t> </a:t>
+            </a:r>
+            <a:r>
+              <a:rPr lang="en-US" altLang="zh-CN" dirty="0" smtClean="0"/>
+              <a:t>only </a:t>
+            </a:r>
+            <a:r>
+              <a:rPr lang="en-US" altLang="zh-CN" dirty="0"/>
+              <a:t>3 </a:t>
+            </a:r>
+            <a:r>
+              <a:rPr lang="en-US" altLang="zh-CN" dirty="0" err="1" smtClean="0"/>
+              <a:t>years.</a:t>
+            </a:r>
+            <a:r>
+              <a:rPr lang="en-US" altLang="zh-CN" dirty="0" err="1" smtClean="0"/>
+              <a:t>Worked</a:t>
+            </a:r>
+            <a:r>
+              <a:rPr lang="zh-CN" altLang="en-US" dirty="0" smtClean="0"/>
+              <a:t> </a:t>
+            </a:r>
+            <a:r>
+              <a:rPr lang="en-US" altLang="zh-CN" dirty="0" smtClean="0"/>
+              <a:t>in</a:t>
+            </a:r>
+            <a:r>
+              <a:rPr lang="zh-CN" altLang="en-US" dirty="0" smtClean="0"/>
+              <a:t> </a:t>
+            </a:r>
+            <a:r>
+              <a:rPr lang="en-US" altLang="zh-CN" dirty="0" smtClean="0"/>
+              <a:t>IBM</a:t>
+            </a:r>
+            <a:r>
+              <a:rPr lang="zh-CN" altLang="en-US" dirty="0" smtClean="0"/>
+              <a:t> </a:t>
+            </a:r>
+            <a:r>
+              <a:rPr lang="en-US" altLang="zh-CN" dirty="0" smtClean="0"/>
+              <a:t>China,</a:t>
+            </a:r>
+            <a:r>
+              <a:rPr lang="zh-CN" altLang="en-US" dirty="0" smtClean="0"/>
+              <a:t> </a:t>
+            </a:r>
+            <a:r>
+              <a:rPr lang="en-US" altLang="zh-CN" dirty="0" smtClean="0"/>
+              <a:t>SAP,</a:t>
+            </a:r>
+            <a:r>
+              <a:rPr lang="zh-CN" altLang="en-US" dirty="0" smtClean="0"/>
+              <a:t> </a:t>
+            </a:r>
+            <a:r>
+              <a:rPr lang="en-US" altLang="zh-CN" dirty="0" smtClean="0"/>
+              <a:t>Autodesk,</a:t>
+            </a:r>
+            <a:r>
+              <a:rPr lang="zh-CN" altLang="en-US" dirty="0" smtClean="0"/>
+              <a:t> </a:t>
+            </a:r>
+            <a:r>
+              <a:rPr lang="en-US" altLang="zh-CN" dirty="0" smtClean="0"/>
+              <a:t>Expedia,</a:t>
+            </a:r>
+            <a:r>
+              <a:rPr lang="zh-CN" altLang="en-US" dirty="0" smtClean="0"/>
+              <a:t> </a:t>
+            </a:r>
+            <a:r>
+              <a:rPr lang="en-US" altLang="zh-CN" dirty="0" err="1" smtClean="0"/>
+              <a:t>Paysafe</a:t>
+            </a:r>
+            <a:r>
+              <a:rPr lang="en-US" altLang="zh-CN" smtClean="0"/>
+              <a:t>.</a:t>
             </a:r>
             <a:endParaRPr kumimoji="1" lang="zh-CN" altLang="en-US" dirty="0"/>
           </a:p>

</xml_diff>